<commit_message>
Fixes due to student feedback
</commit_message>
<xml_diff>
--- a/unit2/Unit2b - Eigenschaften von Wahrscheinlichkeitsraeumen.pptx
+++ b/unit2/Unit2b - Eigenschaften von Wahrscheinlichkeitsraeumen.pptx
@@ -360,7 +360,7 @@
             <a:fld id="{AA592FF2-A4BD-4E98-AC76-A10007E04C10}" type="datetimeFigureOut">
               <a:rPr lang="en-US" smtClean="0"/>
               <a:pPr/>
-              <a:t>10/26/23</a:t>
+              <a:t>10/30/23</a:t>
             </a:fld>
             <a:endParaRPr lang="en-US" dirty="0"/>
           </a:p>
@@ -1217,7 +1217,7 @@
             <a:fld id="{AA592FF2-A4BD-4E98-AC76-A10007E04C10}" type="datetimeFigureOut">
               <a:rPr lang="en-US" smtClean="0"/>
               <a:pPr/>
-              <a:t>10/26/23</a:t>
+              <a:t>10/30/23</a:t>
             </a:fld>
             <a:endParaRPr lang="en-US" dirty="0"/>
           </a:p>

</xml_diff>